<commit_message>
The slides is updated.
</commit_message>
<xml_diff>
--- a/slides/mid-project.pptx
+++ b/slides/mid-project.pptx
@@ -2,24 +2,25 @@
 <file path=ppt/presentation.xml><?xml version="1.0" encoding="utf-8"?>
 <p:presentation xmlns:a="http://schemas.openxmlformats.org/drawingml/2006/main" xmlns:r="http://schemas.openxmlformats.org/officeDocument/2006/relationships" xmlns:mc="http://schemas.openxmlformats.org/markup-compatibility/2006" xmlns:mv="urn:schemas-microsoft-com:mac:vml" xmlns:p="http://schemas.openxmlformats.org/presentationml/2006/main" xmlns:c="http://schemas.openxmlformats.org/drawingml/2006/chart" xmlns:dgm="http://schemas.openxmlformats.org/drawingml/2006/diagram" xmlns:o="urn:schemas-microsoft-com:office:office" xmlns:v="urn:schemas-microsoft-com:vml" xmlns:pvml="urn:schemas-microsoft-com:office:powerpoint" xmlns:com="http://schemas.openxmlformats.org/drawingml/2006/compatibility" xmlns:p14="http://schemas.microsoft.com/office/powerpoint/2010/main" xmlns:p15="http://schemas.microsoft.com/office/powerpoint/2012/main" xmlns:ahyp="http://schemas.microsoft.com/office/drawing/2018/hyperlinkcolor" autoCompressPictures="0" strictFirstAndLastChars="0" saveSubsetFonts="1">
   <p:sldMasterIdLst>
-    <p:sldMasterId id="2147483659" r:id="rId4"/>
+    <p:sldMasterId id="2147483659" r:id="rId5"/>
   </p:sldMasterIdLst>
   <p:notesMasterIdLst>
-    <p:notesMasterId r:id="rId5"/>
+    <p:notesMasterId r:id="rId6"/>
   </p:notesMasterIdLst>
   <p:sldIdLst>
-    <p:sldId id="256" r:id="rId6"/>
-    <p:sldId id="257" r:id="rId7"/>
-    <p:sldId id="258" r:id="rId8"/>
-    <p:sldId id="259" r:id="rId9"/>
-    <p:sldId id="260" r:id="rId10"/>
-    <p:sldId id="261" r:id="rId11"/>
-    <p:sldId id="262" r:id="rId12"/>
-    <p:sldId id="263" r:id="rId13"/>
-    <p:sldId id="264" r:id="rId14"/>
-    <p:sldId id="265" r:id="rId15"/>
-    <p:sldId id="266" r:id="rId16"/>
-    <p:sldId id="267" r:id="rId17"/>
+    <p:sldId id="256" r:id="rId7"/>
+    <p:sldId id="257" r:id="rId8"/>
+    <p:sldId id="258" r:id="rId9"/>
+    <p:sldId id="259" r:id="rId10"/>
+    <p:sldId id="260" r:id="rId11"/>
+    <p:sldId id="261" r:id="rId12"/>
+    <p:sldId id="262" r:id="rId13"/>
+    <p:sldId id="263" r:id="rId14"/>
+    <p:sldId id="264" r:id="rId15"/>
+    <p:sldId id="265" r:id="rId16"/>
+    <p:sldId id="266" r:id="rId17"/>
+    <p:sldId id="267" r:id="rId18"/>
+    <p:sldId id="268" r:id="rId19"/>
   </p:sldIdLst>
   <p:sldSz cy="5143500" cx="9144000"/>
   <p:notesSz cx="6858000" cy="9144000"/>
@@ -815,7 +816,7 @@
       </p:grpSpPr>
       <p:sp>
         <p:nvSpPr>
-          <p:cNvPr id="106" name="Google Shape;106;g2069a6b6f06_0_2333:notes"/>
+          <p:cNvPr id="106" name="Google Shape;106;g207642e42f9_0_0:notes"/>
           <p:cNvSpPr/>
           <p:nvPr>
             <p:ph idx="2" type="sldImg"/>
@@ -850,7 +851,7 @@
       </p:sp>
       <p:sp>
         <p:nvSpPr>
-          <p:cNvPr id="107" name="Google Shape;107;g2069a6b6f06_0_2333:notes"/>
+          <p:cNvPr id="107" name="Google Shape;107;g207642e42f9_0_0:notes"/>
           <p:cNvSpPr txBox="1"/>
           <p:nvPr>
             <p:ph idx="1" type="body"/>
@@ -900,7 +901,7 @@
   <p:cSld>
     <p:spTree>
       <p:nvGrpSpPr>
-        <p:cNvPr id="112" name="Shape 112"/>
+        <p:cNvPr id="111" name="Shape 111"/>
         <p:cNvGrpSpPr/>
         <p:nvPr/>
       </p:nvGrpSpPr>
@@ -914,7 +915,7 @@
       </p:grpSpPr>
       <p:sp>
         <p:nvSpPr>
-          <p:cNvPr id="113" name="Google Shape;113;g2069a6b6f06_0_2720:notes"/>
+          <p:cNvPr id="112" name="Google Shape;112;g2069a6b6f06_0_2333:notes"/>
           <p:cNvSpPr/>
           <p:nvPr>
             <p:ph idx="2" type="sldImg"/>
@@ -949,7 +950,7 @@
       </p:sp>
       <p:sp>
         <p:nvSpPr>
-          <p:cNvPr id="114" name="Google Shape;114;g2069a6b6f06_0_2720:notes"/>
+          <p:cNvPr id="113" name="Google Shape;113;g2069a6b6f06_0_2333:notes"/>
           <p:cNvSpPr txBox="1"/>
           <p:nvPr>
             <p:ph idx="1" type="body"/>
@@ -1013,7 +1014,7 @@
       </p:grpSpPr>
       <p:sp>
         <p:nvSpPr>
-          <p:cNvPr id="119" name="Google Shape;119;g2069a6b6f06_0_26:notes"/>
+          <p:cNvPr id="119" name="Google Shape;119;g2069a6b6f06_0_2720:notes"/>
           <p:cNvSpPr/>
           <p:nvPr>
             <p:ph idx="2" type="sldImg"/>
@@ -1048,7 +1049,106 @@
       </p:sp>
       <p:sp>
         <p:nvSpPr>
-          <p:cNvPr id="120" name="Google Shape;120;g2069a6b6f06_0_26:notes"/>
+          <p:cNvPr id="120" name="Google Shape;120;g2069a6b6f06_0_2720:notes"/>
+          <p:cNvSpPr txBox="1"/>
+          <p:nvPr>
+            <p:ph idx="1" type="body"/>
+          </p:nvPr>
+        </p:nvSpPr>
+        <p:spPr>
+          <a:xfrm>
+            <a:off x="685800" y="4343400"/>
+            <a:ext cx="5486400" cy="4114800"/>
+          </a:xfrm>
+          <a:prstGeom prst="rect">
+            <a:avLst/>
+          </a:prstGeom>
+        </p:spPr>
+        <p:txBody>
+          <a:bodyPr anchorCtr="0" anchor="t" bIns="91425" lIns="91425" spcFirstLastPara="1" rIns="91425" wrap="square" tIns="91425">
+            <a:noAutofit/>
+          </a:bodyPr>
+          <a:lstStyle/>
+          <a:p>
+            <a:pPr indent="0" lvl="0" marL="0" rtl="0" algn="l">
+              <a:spcBef>
+                <a:spcPts val="0"/>
+              </a:spcBef>
+              <a:spcAft>
+                <a:spcPts val="0"/>
+              </a:spcAft>
+              <a:buNone/>
+            </a:pPr>
+            <a:r>
+              <a:t/>
+            </a:r>
+            <a:endParaRPr/>
+          </a:p>
+        </p:txBody>
+      </p:sp>
+    </p:spTree>
+  </p:cSld>
+  <p:clrMapOvr>
+    <a:masterClrMapping/>
+  </p:clrMapOvr>
+</p:notes>
+</file>
+
+<file path=ppt/notesSlides/notesSlide13.xml><?xml version="1.0" encoding="utf-8"?>
+<p:notes xmlns:a="http://schemas.openxmlformats.org/drawingml/2006/main" xmlns:r="http://schemas.openxmlformats.org/officeDocument/2006/relationships" xmlns:mc="http://schemas.openxmlformats.org/markup-compatibility/2006" xmlns:mv="urn:schemas-microsoft-com:mac:vml" xmlns:p="http://schemas.openxmlformats.org/presentationml/2006/main" xmlns:c="http://schemas.openxmlformats.org/drawingml/2006/chart" xmlns:dgm="http://schemas.openxmlformats.org/drawingml/2006/diagram" xmlns:o="urn:schemas-microsoft-com:office:office" xmlns:v="urn:schemas-microsoft-com:vml" xmlns:pvml="urn:schemas-microsoft-com:office:powerpoint" xmlns:com="http://schemas.openxmlformats.org/drawingml/2006/compatibility" xmlns:p14="http://schemas.microsoft.com/office/powerpoint/2010/main" xmlns:p15="http://schemas.microsoft.com/office/powerpoint/2012/main" xmlns:ahyp="http://schemas.microsoft.com/office/drawing/2018/hyperlinkcolor" showMasterPhAnim="0" showMasterSp="0">
+  <p:cSld>
+    <p:spTree>
+      <p:nvGrpSpPr>
+        <p:cNvPr id="124" name="Shape 124"/>
+        <p:cNvGrpSpPr/>
+        <p:nvPr/>
+      </p:nvGrpSpPr>
+      <p:grpSpPr>
+        <a:xfrm>
+          <a:off x="0" y="0"/>
+          <a:ext cx="0" cy="0"/>
+          <a:chOff x="0" y="0"/>
+          <a:chExt cx="0" cy="0"/>
+        </a:xfrm>
+      </p:grpSpPr>
+      <p:sp>
+        <p:nvSpPr>
+          <p:cNvPr id="125" name="Google Shape;125;g2069a6b6f06_0_26:notes"/>
+          <p:cNvSpPr/>
+          <p:nvPr>
+            <p:ph idx="2" type="sldImg"/>
+          </p:nvPr>
+        </p:nvSpPr>
+        <p:spPr>
+          <a:xfrm>
+            <a:off x="381300" y="685800"/>
+            <a:ext cx="6096000" cy="3429000"/>
+          </a:xfrm>
+          <a:custGeom>
+            <a:rect b="b" l="l" r="r" t="t"/>
+            <a:pathLst>
+              <a:path extrusionOk="0" h="120000" w="120000">
+                <a:moveTo>
+                  <a:pt x="0" y="0"/>
+                </a:moveTo>
+                <a:lnTo>
+                  <a:pt x="120000" y="0"/>
+                </a:lnTo>
+                <a:lnTo>
+                  <a:pt x="120000" y="120000"/>
+                </a:lnTo>
+                <a:lnTo>
+                  <a:pt x="0" y="120000"/>
+                </a:lnTo>
+                <a:close/>
+              </a:path>
+            </a:pathLst>
+          </a:custGeom>
+        </p:spPr>
+      </p:sp>
+      <p:sp>
+        <p:nvSpPr>
+          <p:cNvPr id="126" name="Google Shape;126;g2069a6b6f06_0_26:notes"/>
           <p:cNvSpPr txBox="1"/>
           <p:nvPr>
             <p:ph idx="1" type="body"/>
@@ -7150,49 +7250,9 @@
           <a:chExt cx="0" cy="0"/>
         </a:xfrm>
       </p:grpSpPr>
-      <p:sp>
-        <p:nvSpPr>
-          <p:cNvPr id="109" name="Google Shape;109;p22"/>
-          <p:cNvSpPr txBox="1"/>
-          <p:nvPr>
-            <p:ph type="title"/>
-          </p:nvPr>
-        </p:nvSpPr>
-        <p:spPr>
-          <a:xfrm>
-            <a:off x="311700" y="445025"/>
-            <a:ext cx="8520600" cy="572700"/>
-          </a:xfrm>
-          <a:prstGeom prst="rect">
-            <a:avLst/>
-          </a:prstGeom>
-        </p:spPr>
-        <p:txBody>
-          <a:bodyPr anchorCtr="0" anchor="t" bIns="91425" lIns="91425" spcFirstLastPara="1" rIns="91425" wrap="square" tIns="91425">
-            <a:normAutofit fontScale="90000"/>
-          </a:bodyPr>
-          <a:lstStyle/>
-          <a:p>
-            <a:pPr indent="0" lvl="0" marL="0" rtl="0" algn="l">
-              <a:spcBef>
-                <a:spcPts val="0"/>
-              </a:spcBef>
-              <a:spcAft>
-                <a:spcPts val="0"/>
-              </a:spcAft>
-              <a:buNone/>
-            </a:pPr>
-            <a:r>
-              <a:rPr lang="en-GB"/>
-              <a:t>Q4: The length of most movies and TV shows in Netflix?</a:t>
-            </a:r>
-            <a:endParaRPr/>
-          </a:p>
-        </p:txBody>
-      </p:sp>
       <p:pic>
         <p:nvPicPr>
-          <p:cNvPr id="110" name="Google Shape;110;p22"/>
+          <p:cNvPr id="109" name="Google Shape;109;p22"/>
           <p:cNvPicPr preferRelativeResize="0"/>
           <p:nvPr/>
         </p:nvPicPr>
@@ -7206,8 +7266,8 @@
         </p:blipFill>
         <p:spPr>
           <a:xfrm>
-            <a:off x="93300" y="1320800"/>
-            <a:ext cx="4517775" cy="3685700"/>
+            <a:off x="4058475" y="383700"/>
+            <a:ext cx="4936450" cy="4132274"/>
           </a:xfrm>
           <a:prstGeom prst="rect">
             <a:avLst/>
@@ -7218,34 +7278,363 @@
           </a:ln>
         </p:spPr>
       </p:pic>
-      <p:pic>
-        <p:nvPicPr>
-          <p:cNvPr id="111" name="Google Shape;111;p22"/>
-          <p:cNvPicPr preferRelativeResize="0"/>
+      <p:graphicFrame>
+        <p:nvGraphicFramePr>
+          <p:cNvPr id="110" name="Google Shape;110;p22"/>
+          <p:cNvGraphicFramePr/>
           <p:nvPr/>
-        </p:nvPicPr>
-        <p:blipFill>
-          <a:blip r:embed="rId5">
-            <a:alphaModFix/>
-          </a:blip>
-          <a:stretch>
-            <a:fillRect/>
-          </a:stretch>
-        </p:blipFill>
-        <p:spPr>
-          <a:xfrm>
-            <a:off x="4658625" y="1320800"/>
-            <a:ext cx="4332976" cy="3685700"/>
-          </a:xfrm>
-          <a:prstGeom prst="rect">
-            <a:avLst/>
-          </a:prstGeom>
-          <a:noFill/>
-          <a:ln>
-            <a:noFill/>
-          </a:ln>
-        </p:spPr>
-      </p:pic>
+        </p:nvGraphicFramePr>
+        <p:xfrm>
+          <a:off x="144725" y="1000400"/>
+          <a:ext cx="3000000" cy="3000000"/>
+        </p:xfrm>
+        <a:graphic>
+          <a:graphicData uri="http://schemas.openxmlformats.org/drawingml/2006/table">
+            <a:tbl>
+              <a:tblPr>
+                <a:noFill/>
+                <a:tableStyleId>{7F115307-BC5E-4D57-A68B-740A7E349C03}</a:tableStyleId>
+              </a:tblPr>
+              <a:tblGrid>
+                <a:gridCol w="1899450"/>
+                <a:gridCol w="1899450"/>
+              </a:tblGrid>
+              <a:tr h="363925">
+                <a:tc>
+                  <a:txBody>
+                    <a:bodyPr/>
+                    <a:lstStyle/>
+                    <a:p>
+                      <a:pPr indent="0" lvl="0" marL="0" rtl="0" algn="l">
+                        <a:spcBef>
+                          <a:spcPts val="0"/>
+                        </a:spcBef>
+                        <a:spcAft>
+                          <a:spcPts val="0"/>
+                        </a:spcAft>
+                        <a:buNone/>
+                      </a:pPr>
+                      <a:r>
+                        <a:rPr b="1" lang="en-GB">
+                          <a:solidFill>
+                            <a:schemeClr val="lt1"/>
+                          </a:solidFill>
+                        </a:rPr>
+                        <a:t>Age group</a:t>
+                      </a:r>
+                      <a:endParaRPr b="1">
+                        <a:solidFill>
+                          <a:schemeClr val="lt1"/>
+                        </a:solidFill>
+                      </a:endParaRPr>
+                    </a:p>
+                  </a:txBody>
+                  <a:tcPr marT="91425" marB="91425" marR="91425" marL="91425"/>
+                </a:tc>
+                <a:tc>
+                  <a:txBody>
+                    <a:bodyPr/>
+                    <a:lstStyle/>
+                    <a:p>
+                      <a:pPr indent="0" lvl="0" marL="0" rtl="0" algn="l">
+                        <a:spcBef>
+                          <a:spcPts val="0"/>
+                        </a:spcBef>
+                        <a:spcAft>
+                          <a:spcPts val="0"/>
+                        </a:spcAft>
+                        <a:buNone/>
+                      </a:pPr>
+                      <a:r>
+                        <a:rPr b="1" lang="en-GB">
+                          <a:solidFill>
+                            <a:schemeClr val="lt1"/>
+                          </a:solidFill>
+                        </a:rPr>
+                        <a:t>Rating</a:t>
+                      </a:r>
+                      <a:endParaRPr b="1">
+                        <a:solidFill>
+                          <a:schemeClr val="lt1"/>
+                        </a:solidFill>
+                      </a:endParaRPr>
+                    </a:p>
+                  </a:txBody>
+                  <a:tcPr marT="91425" marB="91425" marR="91425" marL="91425"/>
+                </a:tc>
+              </a:tr>
+              <a:tr h="363925">
+                <a:tc>
+                  <a:txBody>
+                    <a:bodyPr/>
+                    <a:lstStyle/>
+                    <a:p>
+                      <a:pPr indent="0" lvl="0" marL="0" rtl="0" algn="l">
+                        <a:spcBef>
+                          <a:spcPts val="0"/>
+                        </a:spcBef>
+                        <a:spcAft>
+                          <a:spcPts val="0"/>
+                        </a:spcAft>
+                        <a:buNone/>
+                      </a:pPr>
+                      <a:r>
+                        <a:rPr lang="en-GB">
+                          <a:solidFill>
+                            <a:schemeClr val="lt1"/>
+                          </a:solidFill>
+                        </a:rPr>
+                        <a:t>Adults</a:t>
+                      </a:r>
+                      <a:endParaRPr>
+                        <a:solidFill>
+                          <a:schemeClr val="lt1"/>
+                        </a:solidFill>
+                      </a:endParaRPr>
+                    </a:p>
+                  </a:txBody>
+                  <a:tcPr marT="91425" marB="91425" marR="91425" marL="91425"/>
+                </a:tc>
+                <a:tc>
+                  <a:txBody>
+                    <a:bodyPr/>
+                    <a:lstStyle/>
+                    <a:p>
+                      <a:pPr indent="0" lvl="0" marL="0" rtl="0" algn="l">
+                        <a:lnSpc>
+                          <a:spcPct val="115000"/>
+                        </a:lnSpc>
+                        <a:spcBef>
+                          <a:spcPts val="1100"/>
+                        </a:spcBef>
+                        <a:spcAft>
+                          <a:spcPts val="700"/>
+                        </a:spcAft>
+                        <a:buNone/>
+                      </a:pPr>
+                      <a:r>
+                        <a:rPr lang="en-GB">
+                          <a:solidFill>
+                            <a:schemeClr val="lt1"/>
+                          </a:solidFill>
+                        </a:rPr>
+                        <a:t>R,NC-17,UR,NR,TV-MA</a:t>
+                      </a:r>
+                      <a:endParaRPr>
+                        <a:solidFill>
+                          <a:schemeClr val="lt1"/>
+                        </a:solidFill>
+                      </a:endParaRPr>
+                    </a:p>
+                  </a:txBody>
+                  <a:tcPr marT="91425" marB="91425" marR="91425" marL="91425"/>
+                </a:tc>
+              </a:tr>
+              <a:tr h="363925">
+                <a:tc>
+                  <a:txBody>
+                    <a:bodyPr/>
+                    <a:lstStyle/>
+                    <a:p>
+                      <a:pPr indent="0" lvl="0" marL="0" rtl="0" algn="l">
+                        <a:spcBef>
+                          <a:spcPts val="0"/>
+                        </a:spcBef>
+                        <a:spcAft>
+                          <a:spcPts val="0"/>
+                        </a:spcAft>
+                        <a:buNone/>
+                      </a:pPr>
+                      <a:r>
+                        <a:rPr lang="en-GB">
+                          <a:solidFill>
+                            <a:schemeClr val="lt1"/>
+                          </a:solidFill>
+                        </a:rPr>
+                        <a:t>Teens</a:t>
+                      </a:r>
+                      <a:endParaRPr>
+                        <a:solidFill>
+                          <a:schemeClr val="lt1"/>
+                        </a:solidFill>
+                      </a:endParaRPr>
+                    </a:p>
+                  </a:txBody>
+                  <a:tcPr marT="91425" marB="91425" marR="91425" marL="91425"/>
+                </a:tc>
+                <a:tc>
+                  <a:txBody>
+                    <a:bodyPr/>
+                    <a:lstStyle/>
+                    <a:p>
+                      <a:pPr indent="0" lvl="0" marL="0" rtl="0" algn="l">
+                        <a:lnSpc>
+                          <a:spcPct val="115000"/>
+                        </a:lnSpc>
+                        <a:spcBef>
+                          <a:spcPts val="1100"/>
+                        </a:spcBef>
+                        <a:spcAft>
+                          <a:spcPts val="700"/>
+                        </a:spcAft>
+                        <a:buNone/>
+                      </a:pPr>
+                      <a:r>
+                        <a:rPr lang="en-GB">
+                          <a:solidFill>
+                            <a:schemeClr val="lt1"/>
+                          </a:solidFill>
+                        </a:rPr>
+                        <a:t>PG,PG-13,TV-14</a:t>
+                      </a:r>
+                      <a:endParaRPr>
+                        <a:solidFill>
+                          <a:schemeClr val="lt1"/>
+                        </a:solidFill>
+                      </a:endParaRPr>
+                    </a:p>
+                  </a:txBody>
+                  <a:tcPr marT="91425" marB="91425" marR="91425" marL="91425"/>
+                </a:tc>
+              </a:tr>
+              <a:tr h="363925">
+                <a:tc>
+                  <a:txBody>
+                    <a:bodyPr/>
+                    <a:lstStyle/>
+                    <a:p>
+                      <a:pPr indent="0" lvl="0" marL="0" rtl="0" algn="l">
+                        <a:spcBef>
+                          <a:spcPts val="0"/>
+                        </a:spcBef>
+                        <a:spcAft>
+                          <a:spcPts val="0"/>
+                        </a:spcAft>
+                        <a:buNone/>
+                      </a:pPr>
+                      <a:r>
+                        <a:rPr lang="en-GB">
+                          <a:solidFill>
+                            <a:schemeClr val="lt1"/>
+                          </a:solidFill>
+                        </a:rPr>
+                        <a:t>Old kids</a:t>
+                      </a:r>
+                      <a:endParaRPr>
+                        <a:solidFill>
+                          <a:schemeClr val="lt1"/>
+                        </a:solidFill>
+                      </a:endParaRPr>
+                    </a:p>
+                  </a:txBody>
+                  <a:tcPr marT="91425" marB="91425" marR="91425" marL="91425"/>
+                </a:tc>
+                <a:tc>
+                  <a:txBody>
+                    <a:bodyPr/>
+                    <a:lstStyle/>
+                    <a:p>
+                      <a:pPr indent="0" lvl="0" marL="0" rtl="0" algn="l">
+                        <a:lnSpc>
+                          <a:spcPct val="115000"/>
+                        </a:lnSpc>
+                        <a:spcBef>
+                          <a:spcPts val="1100"/>
+                        </a:spcBef>
+                        <a:spcAft>
+                          <a:spcPts val="700"/>
+                        </a:spcAft>
+                        <a:buNone/>
+                      </a:pPr>
+                      <a:r>
+                        <a:rPr lang="en-GB">
+                          <a:solidFill>
+                            <a:schemeClr val="lt1"/>
+                          </a:solidFill>
+                        </a:rPr>
+                        <a:t>TV-Y7,TV-Y7-FV,TV-PG</a:t>
+                      </a:r>
+                      <a:endParaRPr>
+                        <a:solidFill>
+                          <a:schemeClr val="lt1"/>
+                        </a:solidFill>
+                      </a:endParaRPr>
+                    </a:p>
+                  </a:txBody>
+                  <a:tcPr marT="91425" marB="91425" marR="91425" marL="91425"/>
+                </a:tc>
+              </a:tr>
+              <a:tr h="363925">
+                <a:tc>
+                  <a:txBody>
+                    <a:bodyPr/>
+                    <a:lstStyle/>
+                    <a:p>
+                      <a:pPr indent="0" lvl="0" marL="0" rtl="0" algn="l">
+                        <a:spcBef>
+                          <a:spcPts val="0"/>
+                        </a:spcBef>
+                        <a:spcAft>
+                          <a:spcPts val="0"/>
+                        </a:spcAft>
+                        <a:buNone/>
+                      </a:pPr>
+                      <a:r>
+                        <a:rPr lang="en-GB">
+                          <a:solidFill>
+                            <a:schemeClr val="lt1"/>
+                          </a:solidFill>
+                        </a:rPr>
+                        <a:t>Kids</a:t>
+                      </a:r>
+                      <a:endParaRPr>
+                        <a:solidFill>
+                          <a:schemeClr val="lt1"/>
+                        </a:solidFill>
+                      </a:endParaRPr>
+                    </a:p>
+                  </a:txBody>
+                  <a:tcPr marT="91425" marB="91425" marR="91425" marL="91425"/>
+                </a:tc>
+                <a:tc>
+                  <a:txBody>
+                    <a:bodyPr/>
+                    <a:lstStyle/>
+                    <a:p>
+                      <a:pPr indent="0" lvl="0" marL="0" rtl="0" algn="l">
+                        <a:lnSpc>
+                          <a:spcPct val="115000"/>
+                        </a:lnSpc>
+                        <a:spcBef>
+                          <a:spcPts val="1100"/>
+                        </a:spcBef>
+                        <a:spcAft>
+                          <a:spcPts val="700"/>
+                        </a:spcAft>
+                        <a:buNone/>
+                      </a:pPr>
+                      <a:r>
+                        <a:rPr lang="en-GB">
+                          <a:solidFill>
+                            <a:schemeClr val="lt1"/>
+                          </a:solidFill>
+                        </a:rPr>
+                        <a:t>G,TV-G,TV-Y</a:t>
+                      </a:r>
+                      <a:endParaRPr>
+                        <a:solidFill>
+                          <a:schemeClr val="lt1"/>
+                        </a:solidFill>
+                      </a:endParaRPr>
+                    </a:p>
+                  </a:txBody>
+                  <a:tcPr marT="91425" marB="91425" marR="91425" marL="91425"/>
+                </a:tc>
+              </a:tr>
+            </a:tbl>
+          </a:graphicData>
+        </a:graphic>
+      </p:graphicFrame>
     </p:spTree>
   </p:cSld>
   <p:clrMapOvr>
@@ -7353,7 +7742,7 @@
                                           </p:stCondLst>
                                         </p:cTn>
                                         <p:tgtEl>
-                                          <p:spTgt spid="111"/>
+                                          <p:spTgt spid="109"/>
                                         </p:tgtEl>
                                         <p:attrNameLst>
                                           <p:attrName>style.visibility</p:attrName>
@@ -7367,7 +7756,7 @@
                                       <p:cBhvr additive="base">
                                         <p:cTn dur="1000"/>
                                         <p:tgtEl>
-                                          <p:spTgt spid="111"/>
+                                          <p:spTgt spid="109"/>
                                         </p:tgtEl>
                                         <p:attrNameLst>
                                           <p:attrName>ppt_x</p:attrName>
@@ -7437,7 +7826,7 @@
     </p:bg>
     <p:spTree>
       <p:nvGrpSpPr>
-        <p:cNvPr id="115" name="Shape 115"/>
+        <p:cNvPr id="114" name="Shape 114"/>
         <p:cNvGrpSpPr/>
         <p:nvPr/>
       </p:nvGrpSpPr>
@@ -7451,7 +7840,306 @@
       </p:grpSpPr>
       <p:sp>
         <p:nvSpPr>
+          <p:cNvPr id="115" name="Google Shape;115;p23"/>
+          <p:cNvSpPr txBox="1"/>
+          <p:nvPr>
+            <p:ph type="title"/>
+          </p:nvPr>
+        </p:nvSpPr>
+        <p:spPr>
+          <a:xfrm>
+            <a:off x="311700" y="445025"/>
+            <a:ext cx="8520600" cy="572700"/>
+          </a:xfrm>
+          <a:prstGeom prst="rect">
+            <a:avLst/>
+          </a:prstGeom>
+        </p:spPr>
+        <p:txBody>
+          <a:bodyPr anchorCtr="0" anchor="t" bIns="91425" lIns="91425" spcFirstLastPara="1" rIns="91425" wrap="square" tIns="91425">
+            <a:normAutofit fontScale="90000"/>
+          </a:bodyPr>
+          <a:lstStyle/>
+          <a:p>
+            <a:pPr indent="0" lvl="0" marL="0" rtl="0" algn="l">
+              <a:spcBef>
+                <a:spcPts val="0"/>
+              </a:spcBef>
+              <a:spcAft>
+                <a:spcPts val="0"/>
+              </a:spcAft>
+              <a:buNone/>
+            </a:pPr>
+            <a:r>
+              <a:rPr lang="en-GB"/>
+              <a:t>Q4: The distribution of movies and TV shows duration?</a:t>
+            </a:r>
+            <a:endParaRPr/>
+          </a:p>
+        </p:txBody>
+      </p:sp>
+      <p:pic>
+        <p:nvPicPr>
           <p:cNvPr id="116" name="Google Shape;116;p23"/>
+          <p:cNvPicPr preferRelativeResize="0"/>
+          <p:nvPr/>
+        </p:nvPicPr>
+        <p:blipFill>
+          <a:blip r:embed="rId4">
+            <a:alphaModFix/>
+          </a:blip>
+          <a:stretch>
+            <a:fillRect/>
+          </a:stretch>
+        </p:blipFill>
+        <p:spPr>
+          <a:xfrm>
+            <a:off x="93300" y="1320800"/>
+            <a:ext cx="4517775" cy="3685700"/>
+          </a:xfrm>
+          <a:prstGeom prst="rect">
+            <a:avLst/>
+          </a:prstGeom>
+          <a:noFill/>
+          <a:ln>
+            <a:noFill/>
+          </a:ln>
+        </p:spPr>
+      </p:pic>
+      <p:pic>
+        <p:nvPicPr>
+          <p:cNvPr id="117" name="Google Shape;117;p23"/>
+          <p:cNvPicPr preferRelativeResize="0"/>
+          <p:nvPr/>
+        </p:nvPicPr>
+        <p:blipFill>
+          <a:blip r:embed="rId5">
+            <a:alphaModFix/>
+          </a:blip>
+          <a:stretch>
+            <a:fillRect/>
+          </a:stretch>
+        </p:blipFill>
+        <p:spPr>
+          <a:xfrm>
+            <a:off x="4658625" y="1320800"/>
+            <a:ext cx="4332976" cy="3685700"/>
+          </a:xfrm>
+          <a:prstGeom prst="rect">
+            <a:avLst/>
+          </a:prstGeom>
+          <a:noFill/>
+          <a:ln>
+            <a:noFill/>
+          </a:ln>
+        </p:spPr>
+      </p:pic>
+    </p:spTree>
+  </p:cSld>
+  <p:clrMapOvr>
+    <a:masterClrMapping/>
+  </p:clrMapOvr>
+  <p:timing>
+    <p:tnLst>
+      <p:par>
+        <p:cTn dur="indefinite" nodeType="tmRoot" restart="never">
+          <p:childTnLst>
+            <p:seq concurrent="1" nextAc="seek">
+              <p:cTn dur="indefinite" id="2" nodeType="mainSeq">
+                <p:childTnLst>
+                  <p:par>
+                    <p:cTn fill="hold">
+                      <p:stCondLst>
+                        <p:cond delay="indefinite"/>
+                      </p:stCondLst>
+                      <p:childTnLst>
+                        <p:par>
+                          <p:cTn fill="hold">
+                            <p:stCondLst>
+                              <p:cond delay="0"/>
+                            </p:stCondLst>
+                            <p:childTnLst>
+                              <p:par>
+                                <p:cTn fill="hold" nodeType="clickEffect" presetClass="entr" presetID="2" presetSubtype="8">
+                                  <p:stCondLst>
+                                    <p:cond delay="0"/>
+                                  </p:stCondLst>
+                                  <p:childTnLst>
+                                    <p:set>
+                                      <p:cBhvr>
+                                        <p:cTn dur="1" fill="hold">
+                                          <p:stCondLst>
+                                            <p:cond delay="0"/>
+                                          </p:stCondLst>
+                                        </p:cTn>
+                                        <p:tgtEl>
+                                          <p:spTgt spid="116"/>
+                                        </p:tgtEl>
+                                        <p:attrNameLst>
+                                          <p:attrName>style.visibility</p:attrName>
+                                        </p:attrNameLst>
+                                      </p:cBhvr>
+                                      <p:to>
+                                        <p:strVal val="visible"/>
+                                      </p:to>
+                                    </p:set>
+                                    <p:anim calcmode="lin" valueType="num">
+                                      <p:cBhvr additive="base">
+                                        <p:cTn dur="1000"/>
+                                        <p:tgtEl>
+                                          <p:spTgt spid="116"/>
+                                        </p:tgtEl>
+                                        <p:attrNameLst>
+                                          <p:attrName>ppt_x</p:attrName>
+                                        </p:attrNameLst>
+                                      </p:cBhvr>
+                                      <p:tavLst>
+                                        <p:tav fmla="" tm="0">
+                                          <p:val>
+                                            <p:strVal val="#ppt_x-1"/>
+                                          </p:val>
+                                        </p:tav>
+                                        <p:tav fmla="" tm="100000">
+                                          <p:val>
+                                            <p:strVal val="#ppt_x"/>
+                                          </p:val>
+                                        </p:tav>
+                                      </p:tavLst>
+                                    </p:anim>
+                                  </p:childTnLst>
+                                </p:cTn>
+                              </p:par>
+                            </p:childTnLst>
+                          </p:cTn>
+                        </p:par>
+                      </p:childTnLst>
+                    </p:cTn>
+                  </p:par>
+                  <p:par>
+                    <p:cTn fill="hold">
+                      <p:stCondLst>
+                        <p:cond delay="indefinite"/>
+                      </p:stCondLst>
+                      <p:childTnLst>
+                        <p:par>
+                          <p:cTn fill="hold">
+                            <p:stCondLst>
+                              <p:cond delay="0"/>
+                            </p:stCondLst>
+                            <p:childTnLst>
+                              <p:par>
+                                <p:cTn fill="hold" nodeType="clickEffect" presetClass="entr" presetID="2" presetSubtype="2">
+                                  <p:stCondLst>
+                                    <p:cond delay="0"/>
+                                  </p:stCondLst>
+                                  <p:childTnLst>
+                                    <p:set>
+                                      <p:cBhvr>
+                                        <p:cTn dur="1" fill="hold">
+                                          <p:stCondLst>
+                                            <p:cond delay="0"/>
+                                          </p:stCondLst>
+                                        </p:cTn>
+                                        <p:tgtEl>
+                                          <p:spTgt spid="117"/>
+                                        </p:tgtEl>
+                                        <p:attrNameLst>
+                                          <p:attrName>style.visibility</p:attrName>
+                                        </p:attrNameLst>
+                                      </p:cBhvr>
+                                      <p:to>
+                                        <p:strVal val="visible"/>
+                                      </p:to>
+                                    </p:set>
+                                    <p:anim calcmode="lin" valueType="num">
+                                      <p:cBhvr additive="base">
+                                        <p:cTn dur="1000"/>
+                                        <p:tgtEl>
+                                          <p:spTgt spid="117"/>
+                                        </p:tgtEl>
+                                        <p:attrNameLst>
+                                          <p:attrName>ppt_x</p:attrName>
+                                        </p:attrNameLst>
+                                      </p:cBhvr>
+                                      <p:tavLst>
+                                        <p:tav fmla="" tm="0">
+                                          <p:val>
+                                            <p:strVal val="#ppt_x+1"/>
+                                          </p:val>
+                                        </p:tav>
+                                        <p:tav fmla="" tm="100000">
+                                          <p:val>
+                                            <p:strVal val="#ppt_x"/>
+                                          </p:val>
+                                        </p:tav>
+                                      </p:tavLst>
+                                    </p:anim>
+                                  </p:childTnLst>
+                                </p:cTn>
+                              </p:par>
+                            </p:childTnLst>
+                          </p:cTn>
+                        </p:par>
+                      </p:childTnLst>
+                    </p:cTn>
+                  </p:par>
+                </p:childTnLst>
+              </p:cTn>
+              <p:prevCondLst>
+                <p:cond evt="onPrev">
+                  <p:tgtEl>
+                    <p:sldTgt/>
+                  </p:tgtEl>
+                </p:cond>
+              </p:prevCondLst>
+              <p:nextCondLst>
+                <p:cond evt="onNext">
+                  <p:tgtEl>
+                    <p:sldTgt/>
+                  </p:tgtEl>
+                </p:cond>
+              </p:nextCondLst>
+            </p:seq>
+          </p:childTnLst>
+        </p:cTn>
+      </p:par>
+    </p:tnLst>
+  </p:timing>
+</p:sld>
+</file>
+
+<file path=ppt/slides/slide12.xml><?xml version="1.0" encoding="utf-8"?>
+<p:sld xmlns:a="http://schemas.openxmlformats.org/drawingml/2006/main" xmlns:r="http://schemas.openxmlformats.org/officeDocument/2006/relationships" xmlns:mc="http://schemas.openxmlformats.org/markup-compatibility/2006" xmlns:mv="urn:schemas-microsoft-com:mac:vml" xmlns:p="http://schemas.openxmlformats.org/presentationml/2006/main" xmlns:c="http://schemas.openxmlformats.org/drawingml/2006/chart" xmlns:dgm="http://schemas.openxmlformats.org/drawingml/2006/diagram" xmlns:o="urn:schemas-microsoft-com:office:office" xmlns:v="urn:schemas-microsoft-com:vml" xmlns:pvml="urn:schemas-microsoft-com:office:powerpoint" xmlns:com="http://schemas.openxmlformats.org/drawingml/2006/compatibility" xmlns:p14="http://schemas.microsoft.com/office/powerpoint/2010/main" xmlns:p15="http://schemas.microsoft.com/office/powerpoint/2012/main" xmlns:ahyp="http://schemas.microsoft.com/office/drawing/2018/hyperlinkcolor">
+  <p:cSld>
+    <p:bg>
+      <p:bgPr>
+        <a:blipFill>
+          <a:blip r:embed="rId3">
+            <a:alphaModFix/>
+          </a:blip>
+          <a:stretch>
+            <a:fillRect/>
+          </a:stretch>
+        </a:blipFill>
+      </p:bgPr>
+    </p:bg>
+    <p:spTree>
+      <p:nvGrpSpPr>
+        <p:cNvPr id="121" name="Shape 121"/>
+        <p:cNvGrpSpPr/>
+        <p:nvPr/>
+      </p:nvGrpSpPr>
+      <p:grpSpPr>
+        <a:xfrm>
+          <a:off x="0" y="0"/>
+          <a:ext cx="0" cy="0"/>
+          <a:chOff x="0" y="0"/>
+          <a:chExt cx="0" cy="0"/>
+        </a:xfrm>
+      </p:grpSpPr>
+      <p:sp>
+        <p:nvSpPr>
+          <p:cNvPr id="122" name="Google Shape;122;p24"/>
           <p:cNvSpPr txBox="1"/>
           <p:nvPr>
             <p:ph type="title"/>
@@ -7504,7 +8192,7 @@
       </p:sp>
       <p:pic>
         <p:nvPicPr>
-          <p:cNvPr id="117" name="Google Shape;117;p23"/>
+          <p:cNvPr id="123" name="Google Shape;123;p24"/>
           <p:cNvPicPr preferRelativeResize="0"/>
           <p:nvPr/>
         </p:nvPicPr>
@@ -7569,7 +8257,7 @@
                                           </p:stCondLst>
                                         </p:cTn>
                                         <p:tgtEl>
-                                          <p:spTgt spid="117"/>
+                                          <p:spTgt spid="123"/>
                                         </p:tgtEl>
                                         <p:attrNameLst>
                                           <p:attrName>style.visibility</p:attrName>
@@ -7583,7 +8271,7 @@
                                       <p:cBhvr additive="base">
                                         <p:cTn dur="1000"/>
                                         <p:tgtEl>
-                                          <p:spTgt spid="117"/>
+                                          <p:spTgt spid="123"/>
                                         </p:tgtEl>
                                         <p:attrNameLst>
                                           <p:attrName>ppt_w</p:attrName>
@@ -7606,7 +8294,7 @@
                                       <p:cBhvr additive="base">
                                         <p:cTn dur="1000"/>
                                         <p:tgtEl>
-                                          <p:spTgt spid="117"/>
+                                          <p:spTgt spid="123"/>
                                         </p:tgtEl>
                                         <p:attrNameLst>
                                           <p:attrName>ppt_h</p:attrName>
@@ -7659,12 +8347,12 @@
 </p:sld>
 </file>
 
-<file path=ppt/slides/slide12.xml><?xml version="1.0" encoding="utf-8"?>
+<file path=ppt/slides/slide13.xml><?xml version="1.0" encoding="utf-8"?>
 <p:sld xmlns:a="http://schemas.openxmlformats.org/drawingml/2006/main" xmlns:r="http://schemas.openxmlformats.org/officeDocument/2006/relationships" xmlns:mc="http://schemas.openxmlformats.org/markup-compatibility/2006" xmlns:mv="urn:schemas-microsoft-com:mac:vml" xmlns:p="http://schemas.openxmlformats.org/presentationml/2006/main" xmlns:c="http://schemas.openxmlformats.org/drawingml/2006/chart" xmlns:dgm="http://schemas.openxmlformats.org/drawingml/2006/diagram" xmlns:o="urn:schemas-microsoft-com:office:office" xmlns:v="urn:schemas-microsoft-com:vml" xmlns:pvml="urn:schemas-microsoft-com:office:powerpoint" xmlns:com="http://schemas.openxmlformats.org/drawingml/2006/compatibility" xmlns:p14="http://schemas.microsoft.com/office/powerpoint/2010/main" xmlns:p15="http://schemas.microsoft.com/office/powerpoint/2012/main" xmlns:ahyp="http://schemas.microsoft.com/office/drawing/2018/hyperlinkcolor">
   <p:cSld>
     <p:spTree>
       <p:nvGrpSpPr>
-        <p:cNvPr id="121" name="Shape 121"/>
+        <p:cNvPr id="127" name="Shape 127"/>
         <p:cNvGrpSpPr/>
         <p:nvPr/>
       </p:nvGrpSpPr>
@@ -7678,7 +8366,7 @@
       </p:grpSpPr>
       <p:pic>
         <p:nvPicPr>
-          <p:cNvPr id="122" name="Google Shape;122;p24"/>
+          <p:cNvPr id="128" name="Google Shape;128;p25"/>
           <p:cNvPicPr preferRelativeResize="0"/>
           <p:nvPr/>
         </p:nvPicPr>
@@ -7706,7 +8394,7 @@
       </p:pic>
       <p:sp>
         <p:nvSpPr>
-          <p:cNvPr id="123" name="Google Shape;123;p24"/>
+          <p:cNvPr id="129" name="Google Shape;129;p25"/>
           <p:cNvSpPr txBox="1"/>
           <p:nvPr/>
         </p:nvSpPr>
@@ -7785,7 +8473,7 @@
                                           </p:stCondLst>
                                         </p:cTn>
                                         <p:tgtEl>
-                                          <p:spTgt spid="123"/>
+                                          <p:spTgt spid="129"/>
                                         </p:tgtEl>
                                         <p:attrNameLst>
                                           <p:attrName>style.visibility</p:attrName>
@@ -7799,7 +8487,7 @@
                                       <p:cBhvr additive="base">
                                         <p:cTn dur="1000"/>
                                         <p:tgtEl>
-                                          <p:spTgt spid="123"/>
+                                          <p:spTgt spid="129"/>
                                         </p:tgtEl>
                                         <p:attrNameLst>
                                           <p:attrName>ppt_y</p:attrName>
@@ -8284,8 +8972,16 @@
               <a:buNone/>
             </a:pPr>
             <a:r>
+              <a:rPr b="1" lang="en-GB">
+                <a:solidFill>
+                  <a:schemeClr val="lt1"/>
+                </a:solidFill>
+              </a:rPr>
+              <a:t>DATA FEATURES</a:t>
+            </a:r>
+            <a:r>
               <a:rPr b="1" lang="en-GB"/>
-              <a:t>DATA FEATURES</a:t>
+              <a:t>ES</a:t>
             </a:r>
             <a:endParaRPr b="1"/>
           </a:p>
@@ -8334,7 +9030,7 @@
                   <a:schemeClr val="lt1"/>
                 </a:solidFill>
               </a:rPr>
-              <a:t>Data source -&gt; kaggle.com</a:t>
+              <a:t>Dataset source -&gt; kaggle.com</a:t>
             </a:r>
             <a:endParaRPr>
               <a:solidFill>
@@ -8895,8 +9591,8 @@
         </p:blipFill>
         <p:spPr>
           <a:xfrm>
-            <a:off x="2312225" y="902925"/>
-            <a:ext cx="4621726" cy="3820975"/>
+            <a:off x="1876987" y="582726"/>
+            <a:ext cx="5390024" cy="4079325"/>
           </a:xfrm>
           <a:prstGeom prst="rect">
             <a:avLst/>
@@ -9099,7 +9795,7 @@
             </a:pPr>
             <a:r>
               <a:rPr lang="en-GB"/>
-              <a:t>Q1: Top countries directed Movies and TV shows?</a:t>
+              <a:t>Q1: Top countries for Movies and TV shows production?</a:t>
             </a:r>
             <a:endParaRPr/>
           </a:p>
@@ -9278,15 +9974,7 @@
                   <a:schemeClr val="lt1"/>
                 </a:solidFill>
               </a:rPr>
-              <a:t>C</a:t>
-            </a:r>
-            <a:r>
-              <a:rPr lang="en-GB">
-                <a:solidFill>
-                  <a:schemeClr val="lt1"/>
-                </a:solidFill>
-              </a:rPr>
-              <a:t>omparison of focus on Movie and TV show</a:t>
+              <a:t>Movies VS. TV shows in top 10 countries</a:t>
             </a:r>
             <a:endParaRPr>
               <a:solidFill>
@@ -9737,8 +10425,8 @@
         </p:blipFill>
         <p:spPr>
           <a:xfrm>
-            <a:off x="4631375" y="418325"/>
-            <a:ext cx="4381624" cy="4525526"/>
+            <a:off x="4557900" y="418325"/>
+            <a:ext cx="4455101" cy="4525526"/>
           </a:xfrm>
           <a:prstGeom prst="rect">
             <a:avLst/>
@@ -9962,7 +10650,7 @@
         </p:nvSpPr>
         <p:spPr>
           <a:xfrm>
-            <a:off x="311700" y="445025"/>
+            <a:off x="311700" y="122175"/>
             <a:ext cx="8520600" cy="572700"/>
           </a:xfrm>
           <a:prstGeom prst="rect">
@@ -10008,8 +10696,8 @@
         </p:blipFill>
         <p:spPr>
           <a:xfrm>
-            <a:off x="4478175" y="1017725"/>
-            <a:ext cx="4640425" cy="3884475"/>
+            <a:off x="193800" y="812700"/>
+            <a:ext cx="4172500" cy="3874350"/>
           </a:xfrm>
           <a:prstGeom prst="rect">
             <a:avLst/>
@@ -10036,8 +10724,8 @@
         </p:blipFill>
         <p:spPr>
           <a:xfrm>
-            <a:off x="127000" y="1017725"/>
-            <a:ext cx="4351174" cy="3884475"/>
+            <a:off x="4478175" y="812700"/>
+            <a:ext cx="4539651" cy="3930000"/>
           </a:xfrm>
           <a:prstGeom prst="rect">
             <a:avLst/>
@@ -10087,7 +10775,7 @@
                                           </p:stCondLst>
                                         </p:cTn>
                                         <p:tgtEl>
-                                          <p:spTgt spid="104"/>
+                                          <p:spTgt spid="103"/>
                                         </p:tgtEl>
                                         <p:attrNameLst>
                                           <p:attrName>style.visibility</p:attrName>
@@ -10101,7 +10789,7 @@
                                       <p:cBhvr additive="base">
                                         <p:cTn dur="1000"/>
                                         <p:tgtEl>
-                                          <p:spTgt spid="104"/>
+                                          <p:spTgt spid="103"/>
                                         </p:tgtEl>
                                         <p:attrNameLst>
                                           <p:attrName>ppt_x</p:attrName>
@@ -10155,7 +10843,7 @@
                                           </p:stCondLst>
                                         </p:cTn>
                                         <p:tgtEl>
-                                          <p:spTgt spid="103"/>
+                                          <p:spTgt spid="104"/>
                                         </p:tgtEl>
                                         <p:attrNameLst>
                                           <p:attrName>style.visibility</p:attrName>
@@ -10169,7 +10857,7 @@
                                       <p:cBhvr additive="base">
                                         <p:cTn dur="1000"/>
                                         <p:tgtEl>
-                                          <p:spTgt spid="103"/>
+                                          <p:spTgt spid="104"/>
                                         </p:tgtEl>
                                         <p:attrNameLst>
                                           <p:attrName>ppt_x</p:attrName>
@@ -10223,6 +10911,285 @@
 </file>
 
 <file path=ppt/theme/theme1.xml><?xml version="1.0" encoding="utf-8"?>
+<a:theme xmlns:a="http://schemas.openxmlformats.org/drawingml/2006/main" xmlns:r="http://schemas.openxmlformats.org/officeDocument/2006/relationships" name="Simple Light">
+  <a:themeElements>
+    <a:clrScheme name="Simple Light">
+      <a:dk1>
+        <a:srgbClr val="000000"/>
+      </a:dk1>
+      <a:lt1>
+        <a:srgbClr val="FFFFFF"/>
+      </a:lt1>
+      <a:dk2>
+        <a:srgbClr val="595959"/>
+      </a:dk2>
+      <a:lt2>
+        <a:srgbClr val="EEEEEE"/>
+      </a:lt2>
+      <a:accent1>
+        <a:srgbClr val="4285F4"/>
+      </a:accent1>
+      <a:accent2>
+        <a:srgbClr val="212121"/>
+      </a:accent2>
+      <a:accent3>
+        <a:srgbClr val="78909C"/>
+      </a:accent3>
+      <a:accent4>
+        <a:srgbClr val="FFAB40"/>
+      </a:accent4>
+      <a:accent5>
+        <a:srgbClr val="0097A7"/>
+      </a:accent5>
+      <a:accent6>
+        <a:srgbClr val="EEFF41"/>
+      </a:accent6>
+      <a:hlink>
+        <a:srgbClr val="0097A7"/>
+      </a:hlink>
+      <a:folHlink>
+        <a:srgbClr val="0097A7"/>
+      </a:folHlink>
+    </a:clrScheme>
+    <a:fontScheme name="Office">
+      <a:majorFont>
+        <a:latin typeface="Arial"/>
+        <a:ea typeface=""/>
+        <a:cs typeface=""/>
+        <a:font script="Jpan" typeface="ＭＳ Ｐゴシック"/>
+        <a:font script="Hang" typeface="맑은 고딕"/>
+        <a:font script="Hans" typeface="宋体"/>
+        <a:font script="Hant" typeface="新細明體"/>
+        <a:font script="Arab" typeface="Times New Roman"/>
+        <a:font script="Hebr" typeface="Times New Roman"/>
+        <a:font script="Thai" typeface="Angsana New"/>
+        <a:font script="Ethi" typeface="Nyala"/>
+        <a:font script="Beng" typeface="Vrinda"/>
+        <a:font script="Gujr" typeface="Shruti"/>
+        <a:font script="Khmr" typeface="MoolBoran"/>
+        <a:font script="Knda" typeface="Tunga"/>
+        <a:font script="Guru" typeface="Raavi"/>
+        <a:font script="Cans" typeface="Euphemia"/>
+        <a:font script="Cher" typeface="Plantagenet Cherokee"/>
+        <a:font script="Yiii" typeface="Microsoft Yi Baiti"/>
+        <a:font script="Tibt" typeface="Microsoft Himalaya"/>
+        <a:font script="Thaa" typeface="MV Boli"/>
+        <a:font script="Deva" typeface="Mangal"/>
+        <a:font script="Telu" typeface="Gautami"/>
+        <a:font script="Taml" typeface="Latha"/>
+        <a:font script="Syrc" typeface="Estrangelo Edessa"/>
+        <a:font script="Orya" typeface="Kalinga"/>
+        <a:font script="Mlym" typeface="Kartika"/>
+        <a:font script="Laoo" typeface="DokChampa"/>
+        <a:font script="Sinh" typeface="Iskoola Pota"/>
+        <a:font script="Mong" typeface="Mongolian Baiti"/>
+        <a:font script="Viet" typeface="Times New Roman"/>
+        <a:font script="Uigh" typeface="Microsoft Uighur"/>
+        <a:font script="Geor" typeface="Sylfaen"/>
+      </a:majorFont>
+      <a:minorFont>
+        <a:latin typeface="Arial"/>
+        <a:ea typeface=""/>
+        <a:cs typeface=""/>
+        <a:font script="Jpan" typeface="ＭＳ Ｐゴシック"/>
+        <a:font script="Hang" typeface="맑은 고딕"/>
+        <a:font script="Hans" typeface="宋体"/>
+        <a:font script="Hant" typeface="新細明體"/>
+        <a:font script="Arab" typeface="Arial"/>
+        <a:font script="Hebr" typeface="Arial"/>
+        <a:font script="Thai" typeface="Cordia New"/>
+        <a:font script="Ethi" typeface="Nyala"/>
+        <a:font script="Beng" typeface="Vrinda"/>
+        <a:font script="Gujr" typeface="Shruti"/>
+        <a:font script="Khmr" typeface="DaunPenh"/>
+        <a:font script="Knda" typeface="Tunga"/>
+        <a:font script="Guru" typeface="Raavi"/>
+        <a:font script="Cans" typeface="Euphemia"/>
+        <a:font script="Cher" typeface="Plantagenet Cherokee"/>
+        <a:font script="Yiii" typeface="Microsoft Yi Baiti"/>
+        <a:font script="Tibt" typeface="Microsoft Himalaya"/>
+        <a:font script="Thaa" typeface="MV Boli"/>
+        <a:font script="Deva" typeface="Mangal"/>
+        <a:font script="Telu" typeface="Gautami"/>
+        <a:font script="Taml" typeface="Latha"/>
+        <a:font script="Syrc" typeface="Estrangelo Edessa"/>
+        <a:font script="Orya" typeface="Kalinga"/>
+        <a:font script="Mlym" typeface="Kartika"/>
+        <a:font script="Laoo" typeface="DokChampa"/>
+        <a:font script="Sinh" typeface="Iskoola Pota"/>
+        <a:font script="Mong" typeface="Mongolian Baiti"/>
+        <a:font script="Viet" typeface="Arial"/>
+        <a:font script="Uigh" typeface="Microsoft Uighur"/>
+        <a:font script="Geor" typeface="Sylfaen"/>
+      </a:minorFont>
+    </a:fontScheme>
+    <a:fmtScheme name="Office">
+      <a:fillStyleLst>
+        <a:solidFill>
+          <a:schemeClr val="phClr"/>
+        </a:solidFill>
+        <a:gradFill rotWithShape="1">
+          <a:gsLst>
+            <a:gs pos="0">
+              <a:schemeClr val="phClr">
+                <a:tint val="50000"/>
+                <a:satMod val="300000"/>
+              </a:schemeClr>
+            </a:gs>
+            <a:gs pos="35000">
+              <a:schemeClr val="phClr">
+                <a:tint val="37000"/>
+                <a:satMod val="300000"/>
+              </a:schemeClr>
+            </a:gs>
+            <a:gs pos="100000">
+              <a:schemeClr val="phClr">
+                <a:tint val="15000"/>
+                <a:satMod val="350000"/>
+              </a:schemeClr>
+            </a:gs>
+          </a:gsLst>
+          <a:lin ang="16200000" scaled="1"/>
+        </a:gradFill>
+        <a:gradFill rotWithShape="1">
+          <a:gsLst>
+            <a:gs pos="0">
+              <a:schemeClr val="phClr">
+                <a:tint val="100000"/>
+                <a:shade val="100000"/>
+                <a:satMod val="130000"/>
+              </a:schemeClr>
+            </a:gs>
+            <a:gs pos="100000">
+              <a:schemeClr val="phClr">
+                <a:tint val="50000"/>
+                <a:shade val="100000"/>
+                <a:satMod val="350000"/>
+              </a:schemeClr>
+            </a:gs>
+          </a:gsLst>
+          <a:lin ang="16200000" scaled="0"/>
+        </a:gradFill>
+      </a:fillStyleLst>
+      <a:lnStyleLst>
+        <a:ln w="9525" cap="flat" cmpd="sng" algn="ctr">
+          <a:solidFill>
+            <a:schemeClr val="phClr">
+              <a:shade val="95000"/>
+              <a:satMod val="105000"/>
+            </a:schemeClr>
+          </a:solidFill>
+          <a:prstDash val="solid"/>
+        </a:ln>
+        <a:ln w="25400" cap="flat" cmpd="sng" algn="ctr">
+          <a:solidFill>
+            <a:schemeClr val="phClr"/>
+          </a:solidFill>
+          <a:prstDash val="solid"/>
+        </a:ln>
+        <a:ln w="38100" cap="flat" cmpd="sng" algn="ctr">
+          <a:solidFill>
+            <a:schemeClr val="phClr"/>
+          </a:solidFill>
+          <a:prstDash val="solid"/>
+        </a:ln>
+      </a:lnStyleLst>
+      <a:effectStyleLst>
+        <a:effectStyle>
+          <a:effectLst>
+            <a:outerShdw blurRad="40000" dist="20000" dir="5400000" rotWithShape="0">
+              <a:srgbClr val="000000">
+                <a:alpha val="38000"/>
+              </a:srgbClr>
+            </a:outerShdw>
+          </a:effectLst>
+        </a:effectStyle>
+        <a:effectStyle>
+          <a:effectLst>
+            <a:outerShdw blurRad="40000" dist="23000" dir="5400000" rotWithShape="0">
+              <a:srgbClr val="000000">
+                <a:alpha val="35000"/>
+              </a:srgbClr>
+            </a:outerShdw>
+          </a:effectLst>
+        </a:effectStyle>
+        <a:effectStyle>
+          <a:effectLst>
+            <a:outerShdw blurRad="40000" dist="23000" dir="5400000" rotWithShape="0">
+              <a:srgbClr val="000000">
+                <a:alpha val="35000"/>
+              </a:srgbClr>
+            </a:outerShdw>
+          </a:effectLst>
+          <a:scene3d>
+            <a:camera prst="orthographicFront">
+              <a:rot lat="0" lon="0" rev="0"/>
+            </a:camera>
+            <a:lightRig rig="threePt" dir="t">
+              <a:rot lat="0" lon="0" rev="1200000"/>
+            </a:lightRig>
+          </a:scene3d>
+          <a:sp3d>
+            <a:bevelT w="63500" h="25400"/>
+          </a:sp3d>
+        </a:effectStyle>
+      </a:effectStyleLst>
+      <a:bgFillStyleLst>
+        <a:solidFill>
+          <a:schemeClr val="phClr"/>
+        </a:solidFill>
+        <a:gradFill rotWithShape="1">
+          <a:gsLst>
+            <a:gs pos="0">
+              <a:schemeClr val="phClr">
+                <a:tint val="40000"/>
+                <a:satMod val="350000"/>
+              </a:schemeClr>
+            </a:gs>
+            <a:gs pos="40000">
+              <a:schemeClr val="phClr">
+                <a:tint val="45000"/>
+                <a:shade val="99000"/>
+                <a:satMod val="350000"/>
+              </a:schemeClr>
+            </a:gs>
+            <a:gs pos="100000">
+              <a:schemeClr val="phClr">
+                <a:shade val="20000"/>
+                <a:satMod val="255000"/>
+              </a:schemeClr>
+            </a:gs>
+          </a:gsLst>
+          <a:path path="circle">
+            <a:fillToRect l="50000" t="-80000" r="50000" b="180000"/>
+          </a:path>
+        </a:gradFill>
+        <a:gradFill rotWithShape="1">
+          <a:gsLst>
+            <a:gs pos="0">
+              <a:schemeClr val="phClr">
+                <a:tint val="80000"/>
+                <a:satMod val="300000"/>
+              </a:schemeClr>
+            </a:gs>
+            <a:gs pos="100000">
+              <a:schemeClr val="phClr">
+                <a:shade val="30000"/>
+                <a:satMod val="200000"/>
+              </a:schemeClr>
+            </a:gs>
+          </a:gsLst>
+          <a:path path="circle">
+            <a:fillToRect l="50000" t="50000" r="50000" b="50000"/>
+          </a:path>
+        </a:gradFill>
+      </a:bgFillStyleLst>
+    </a:fmtScheme>
+  </a:themeElements>
+</a:theme>
+</file>
+
+<file path=ppt/theme/theme2.xml><?xml version="1.0" encoding="utf-8"?>
 <a:theme xmlns:a="http://schemas.openxmlformats.org/drawingml/2006/main" xmlns:r="http://schemas.openxmlformats.org/officeDocument/2006/relationships">
   <a:themeElements>
     <a:clrScheme name="Default">
@@ -10499,283 +11466,4 @@
     </a:fmtScheme>
   </a:themeElements>
 </a:theme>
-</file>
-
-<file path=ppt/theme/theme2.xml><?xml version="1.0" encoding="utf-8"?>
-<a:theme xmlns:a="http://schemas.openxmlformats.org/drawingml/2006/main" xmlns:r="http://schemas.openxmlformats.org/officeDocument/2006/relationships" name="Simple Light">
-  <a:themeElements>
-    <a:clrScheme name="Simple Light">
-      <a:dk1>
-        <a:srgbClr val="000000"/>
-      </a:dk1>
-      <a:lt1>
-        <a:srgbClr val="FFFFFF"/>
-      </a:lt1>
-      <a:dk2>
-        <a:srgbClr val="595959"/>
-      </a:dk2>
-      <a:lt2>
-        <a:srgbClr val="EEEEEE"/>
-      </a:lt2>
-      <a:accent1>
-        <a:srgbClr val="4285F4"/>
-      </a:accent1>
-      <a:accent2>
-        <a:srgbClr val="212121"/>
-      </a:accent2>
-      <a:accent3>
-        <a:srgbClr val="78909C"/>
-      </a:accent3>
-      <a:accent4>
-        <a:srgbClr val="FFAB40"/>
-      </a:accent4>
-      <a:accent5>
-        <a:srgbClr val="0097A7"/>
-      </a:accent5>
-      <a:accent6>
-        <a:srgbClr val="EEFF41"/>
-      </a:accent6>
-      <a:hlink>
-        <a:srgbClr val="0097A7"/>
-      </a:hlink>
-      <a:folHlink>
-        <a:srgbClr val="0097A7"/>
-      </a:folHlink>
-    </a:clrScheme>
-    <a:fontScheme name="Office">
-      <a:majorFont>
-        <a:latin typeface="Arial"/>
-        <a:ea typeface=""/>
-        <a:cs typeface=""/>
-        <a:font script="Jpan" typeface="ＭＳ Ｐゴシック"/>
-        <a:font script="Hang" typeface="맑은 고딕"/>
-        <a:font script="Hans" typeface="宋体"/>
-        <a:font script="Hant" typeface="新細明體"/>
-        <a:font script="Arab" typeface="Times New Roman"/>
-        <a:font script="Hebr" typeface="Times New Roman"/>
-        <a:font script="Thai" typeface="Angsana New"/>
-        <a:font script="Ethi" typeface="Nyala"/>
-        <a:font script="Beng" typeface="Vrinda"/>
-        <a:font script="Gujr" typeface="Shruti"/>
-        <a:font script="Khmr" typeface="MoolBoran"/>
-        <a:font script="Knda" typeface="Tunga"/>
-        <a:font script="Guru" typeface="Raavi"/>
-        <a:font script="Cans" typeface="Euphemia"/>
-        <a:font script="Cher" typeface="Plantagenet Cherokee"/>
-        <a:font script="Yiii" typeface="Microsoft Yi Baiti"/>
-        <a:font script="Tibt" typeface="Microsoft Himalaya"/>
-        <a:font script="Thaa" typeface="MV Boli"/>
-        <a:font script="Deva" typeface="Mangal"/>
-        <a:font script="Telu" typeface="Gautami"/>
-        <a:font script="Taml" typeface="Latha"/>
-        <a:font script="Syrc" typeface="Estrangelo Edessa"/>
-        <a:font script="Orya" typeface="Kalinga"/>
-        <a:font script="Mlym" typeface="Kartika"/>
-        <a:font script="Laoo" typeface="DokChampa"/>
-        <a:font script="Sinh" typeface="Iskoola Pota"/>
-        <a:font script="Mong" typeface="Mongolian Baiti"/>
-        <a:font script="Viet" typeface="Times New Roman"/>
-        <a:font script="Uigh" typeface="Microsoft Uighur"/>
-        <a:font script="Geor" typeface="Sylfaen"/>
-      </a:majorFont>
-      <a:minorFont>
-        <a:latin typeface="Arial"/>
-        <a:ea typeface=""/>
-        <a:cs typeface=""/>
-        <a:font script="Jpan" typeface="ＭＳ Ｐゴシック"/>
-        <a:font script="Hang" typeface="맑은 고딕"/>
-        <a:font script="Hans" typeface="宋体"/>
-        <a:font script="Hant" typeface="新細明體"/>
-        <a:font script="Arab" typeface="Arial"/>
-        <a:font script="Hebr" typeface="Arial"/>
-        <a:font script="Thai" typeface="Cordia New"/>
-        <a:font script="Ethi" typeface="Nyala"/>
-        <a:font script="Beng" typeface="Vrinda"/>
-        <a:font script="Gujr" typeface="Shruti"/>
-        <a:font script="Khmr" typeface="DaunPenh"/>
-        <a:font script="Knda" typeface="Tunga"/>
-        <a:font script="Guru" typeface="Raavi"/>
-        <a:font script="Cans" typeface="Euphemia"/>
-        <a:font script="Cher" typeface="Plantagenet Cherokee"/>
-        <a:font script="Yiii" typeface="Microsoft Yi Baiti"/>
-        <a:font script="Tibt" typeface="Microsoft Himalaya"/>
-        <a:font script="Thaa" typeface="MV Boli"/>
-        <a:font script="Deva" typeface="Mangal"/>
-        <a:font script="Telu" typeface="Gautami"/>
-        <a:font script="Taml" typeface="Latha"/>
-        <a:font script="Syrc" typeface="Estrangelo Edessa"/>
-        <a:font script="Orya" typeface="Kalinga"/>
-        <a:font script="Mlym" typeface="Kartika"/>
-        <a:font script="Laoo" typeface="DokChampa"/>
-        <a:font script="Sinh" typeface="Iskoola Pota"/>
-        <a:font script="Mong" typeface="Mongolian Baiti"/>
-        <a:font script="Viet" typeface="Arial"/>
-        <a:font script="Uigh" typeface="Microsoft Uighur"/>
-        <a:font script="Geor" typeface="Sylfaen"/>
-      </a:minorFont>
-    </a:fontScheme>
-    <a:fmtScheme name="Office">
-      <a:fillStyleLst>
-        <a:solidFill>
-          <a:schemeClr val="phClr"/>
-        </a:solidFill>
-        <a:gradFill rotWithShape="1">
-          <a:gsLst>
-            <a:gs pos="0">
-              <a:schemeClr val="phClr">
-                <a:tint val="50000"/>
-                <a:satMod val="300000"/>
-              </a:schemeClr>
-            </a:gs>
-            <a:gs pos="35000">
-              <a:schemeClr val="phClr">
-                <a:tint val="37000"/>
-                <a:satMod val="300000"/>
-              </a:schemeClr>
-            </a:gs>
-            <a:gs pos="100000">
-              <a:schemeClr val="phClr">
-                <a:tint val="15000"/>
-                <a:satMod val="350000"/>
-              </a:schemeClr>
-            </a:gs>
-          </a:gsLst>
-          <a:lin ang="16200000" scaled="1"/>
-        </a:gradFill>
-        <a:gradFill rotWithShape="1">
-          <a:gsLst>
-            <a:gs pos="0">
-              <a:schemeClr val="phClr">
-                <a:tint val="100000"/>
-                <a:shade val="100000"/>
-                <a:satMod val="130000"/>
-              </a:schemeClr>
-            </a:gs>
-            <a:gs pos="100000">
-              <a:schemeClr val="phClr">
-                <a:tint val="50000"/>
-                <a:shade val="100000"/>
-                <a:satMod val="350000"/>
-              </a:schemeClr>
-            </a:gs>
-          </a:gsLst>
-          <a:lin ang="16200000" scaled="0"/>
-        </a:gradFill>
-      </a:fillStyleLst>
-      <a:lnStyleLst>
-        <a:ln w="9525" cap="flat" cmpd="sng" algn="ctr">
-          <a:solidFill>
-            <a:schemeClr val="phClr">
-              <a:shade val="95000"/>
-              <a:satMod val="105000"/>
-            </a:schemeClr>
-          </a:solidFill>
-          <a:prstDash val="solid"/>
-        </a:ln>
-        <a:ln w="25400" cap="flat" cmpd="sng" algn="ctr">
-          <a:solidFill>
-            <a:schemeClr val="phClr"/>
-          </a:solidFill>
-          <a:prstDash val="solid"/>
-        </a:ln>
-        <a:ln w="38100" cap="flat" cmpd="sng" algn="ctr">
-          <a:solidFill>
-            <a:schemeClr val="phClr"/>
-          </a:solidFill>
-          <a:prstDash val="solid"/>
-        </a:ln>
-      </a:lnStyleLst>
-      <a:effectStyleLst>
-        <a:effectStyle>
-          <a:effectLst>
-            <a:outerShdw blurRad="40000" dist="20000" dir="5400000" rotWithShape="0">
-              <a:srgbClr val="000000">
-                <a:alpha val="38000"/>
-              </a:srgbClr>
-            </a:outerShdw>
-          </a:effectLst>
-        </a:effectStyle>
-        <a:effectStyle>
-          <a:effectLst>
-            <a:outerShdw blurRad="40000" dist="23000" dir="5400000" rotWithShape="0">
-              <a:srgbClr val="000000">
-                <a:alpha val="35000"/>
-              </a:srgbClr>
-            </a:outerShdw>
-          </a:effectLst>
-        </a:effectStyle>
-        <a:effectStyle>
-          <a:effectLst>
-            <a:outerShdw blurRad="40000" dist="23000" dir="5400000" rotWithShape="0">
-              <a:srgbClr val="000000">
-                <a:alpha val="35000"/>
-              </a:srgbClr>
-            </a:outerShdw>
-          </a:effectLst>
-          <a:scene3d>
-            <a:camera prst="orthographicFront">
-              <a:rot lat="0" lon="0" rev="0"/>
-            </a:camera>
-            <a:lightRig rig="threePt" dir="t">
-              <a:rot lat="0" lon="0" rev="1200000"/>
-            </a:lightRig>
-          </a:scene3d>
-          <a:sp3d>
-            <a:bevelT w="63500" h="25400"/>
-          </a:sp3d>
-        </a:effectStyle>
-      </a:effectStyleLst>
-      <a:bgFillStyleLst>
-        <a:solidFill>
-          <a:schemeClr val="phClr"/>
-        </a:solidFill>
-        <a:gradFill rotWithShape="1">
-          <a:gsLst>
-            <a:gs pos="0">
-              <a:schemeClr val="phClr">
-                <a:tint val="40000"/>
-                <a:satMod val="350000"/>
-              </a:schemeClr>
-            </a:gs>
-            <a:gs pos="40000">
-              <a:schemeClr val="phClr">
-                <a:tint val="45000"/>
-                <a:shade val="99000"/>
-                <a:satMod val="350000"/>
-              </a:schemeClr>
-            </a:gs>
-            <a:gs pos="100000">
-              <a:schemeClr val="phClr">
-                <a:shade val="20000"/>
-                <a:satMod val="255000"/>
-              </a:schemeClr>
-            </a:gs>
-          </a:gsLst>
-          <a:path path="circle">
-            <a:fillToRect l="50000" t="-80000" r="50000" b="180000"/>
-          </a:path>
-        </a:gradFill>
-        <a:gradFill rotWithShape="1">
-          <a:gsLst>
-            <a:gs pos="0">
-              <a:schemeClr val="phClr">
-                <a:tint val="80000"/>
-                <a:satMod val="300000"/>
-              </a:schemeClr>
-            </a:gs>
-            <a:gs pos="100000">
-              <a:schemeClr val="phClr">
-                <a:shade val="30000"/>
-                <a:satMod val="200000"/>
-              </a:schemeClr>
-            </a:gs>
-          </a:gsLst>
-          <a:path path="circle">
-            <a:fillToRect l="50000" t="50000" r="50000" b="50000"/>
-          </a:path>
-        </a:gradFill>
-      </a:bgFillStyleLst>
-    </a:fmtScheme>
-  </a:themeElements>
-</a:theme>
 </file>
</xml_diff>